<commit_message>
final updates to project
</commit_message>
<xml_diff>
--- a/Stroke prediction power_point.pptx
+++ b/Stroke prediction power_point.pptx
@@ -12,6 +12,7 @@
     <p:sldId id="260" r:id="rId6"/>
     <p:sldId id="261" r:id="rId7"/>
     <p:sldId id="262" r:id="rId8"/>
+    <p:sldId id="264" r:id="rId9"/>
   </p:sldIdLst>
   <p:sldSz cx="12192000" cy="6858000"/>
   <p:notesSz cx="6858000" cy="9144000"/>
@@ -110,6 +111,11 @@
       </a:defRPr>
     </a:lvl9pPr>
   </p:defaultTextStyle>
+  <p:extLst>
+    <p:ext uri="{EFAFB233-063F-42B5-8137-9DF3F51BA10A}">
+      <p15:sldGuideLst xmlns:p15="http://schemas.microsoft.com/office/powerpoint/2012/main"/>
+    </p:ext>
+  </p:extLst>
 </p:presentation>
 </file>
 
@@ -260,7 +266,7 @@
           <a:p>
             <a:fld id="{4066D812-833C-430E-A020-BDC2D4076245}" type="datetimeFigureOut">
               <a:rPr lang="en-US" smtClean="0"/>
-              <a:t>4/27/2021</a:t>
+              <a:t>4/28/2021</a:t>
             </a:fld>
             <a:endParaRPr lang="en-US"/>
           </a:p>
@@ -458,7 +464,7 @@
           <a:p>
             <a:fld id="{4066D812-833C-430E-A020-BDC2D4076245}" type="datetimeFigureOut">
               <a:rPr lang="en-US" smtClean="0"/>
-              <a:t>4/27/2021</a:t>
+              <a:t>4/28/2021</a:t>
             </a:fld>
             <a:endParaRPr lang="en-US"/>
           </a:p>
@@ -666,7 +672,7 @@
           <a:p>
             <a:fld id="{4066D812-833C-430E-A020-BDC2D4076245}" type="datetimeFigureOut">
               <a:rPr lang="en-US" smtClean="0"/>
-              <a:t>4/27/2021</a:t>
+              <a:t>4/28/2021</a:t>
             </a:fld>
             <a:endParaRPr lang="en-US"/>
           </a:p>
@@ -864,7 +870,7 @@
           <a:p>
             <a:fld id="{4066D812-833C-430E-A020-BDC2D4076245}" type="datetimeFigureOut">
               <a:rPr lang="en-US" smtClean="0"/>
-              <a:t>4/27/2021</a:t>
+              <a:t>4/28/2021</a:t>
             </a:fld>
             <a:endParaRPr lang="en-US"/>
           </a:p>
@@ -1139,7 +1145,7 @@
           <a:p>
             <a:fld id="{4066D812-833C-430E-A020-BDC2D4076245}" type="datetimeFigureOut">
               <a:rPr lang="en-US" smtClean="0"/>
-              <a:t>4/27/2021</a:t>
+              <a:t>4/28/2021</a:t>
             </a:fld>
             <a:endParaRPr lang="en-US"/>
           </a:p>
@@ -1404,7 +1410,7 @@
           <a:p>
             <a:fld id="{4066D812-833C-430E-A020-BDC2D4076245}" type="datetimeFigureOut">
               <a:rPr lang="en-US" smtClean="0"/>
-              <a:t>4/27/2021</a:t>
+              <a:t>4/28/2021</a:t>
             </a:fld>
             <a:endParaRPr lang="en-US"/>
           </a:p>
@@ -1816,7 +1822,7 @@
           <a:p>
             <a:fld id="{4066D812-833C-430E-A020-BDC2D4076245}" type="datetimeFigureOut">
               <a:rPr lang="en-US" smtClean="0"/>
-              <a:t>4/27/2021</a:t>
+              <a:t>4/28/2021</a:t>
             </a:fld>
             <a:endParaRPr lang="en-US"/>
           </a:p>
@@ -1957,7 +1963,7 @@
           <a:p>
             <a:fld id="{4066D812-833C-430E-A020-BDC2D4076245}" type="datetimeFigureOut">
               <a:rPr lang="en-US" smtClean="0"/>
-              <a:t>4/27/2021</a:t>
+              <a:t>4/28/2021</a:t>
             </a:fld>
             <a:endParaRPr lang="en-US"/>
           </a:p>
@@ -2070,7 +2076,7 @@
           <a:p>
             <a:fld id="{4066D812-833C-430E-A020-BDC2D4076245}" type="datetimeFigureOut">
               <a:rPr lang="en-US" smtClean="0"/>
-              <a:t>4/27/2021</a:t>
+              <a:t>4/28/2021</a:t>
             </a:fld>
             <a:endParaRPr lang="en-US"/>
           </a:p>
@@ -2381,7 +2387,7 @@
           <a:p>
             <a:fld id="{4066D812-833C-430E-A020-BDC2D4076245}" type="datetimeFigureOut">
               <a:rPr lang="en-US" smtClean="0"/>
-              <a:t>4/27/2021</a:t>
+              <a:t>4/28/2021</a:t>
             </a:fld>
             <a:endParaRPr lang="en-US"/>
           </a:p>
@@ -2669,7 +2675,7 @@
           <a:p>
             <a:fld id="{4066D812-833C-430E-A020-BDC2D4076245}" type="datetimeFigureOut">
               <a:rPr lang="en-US" smtClean="0"/>
-              <a:t>4/27/2021</a:t>
+              <a:t>4/28/2021</a:t>
             </a:fld>
             <a:endParaRPr lang="en-US"/>
           </a:p>
@@ -2910,7 +2916,7 @@
           <a:p>
             <a:fld id="{4066D812-833C-430E-A020-BDC2D4076245}" type="datetimeFigureOut">
               <a:rPr lang="en-US" smtClean="0"/>
-              <a:t>4/27/2021</a:t>
+              <a:t>4/28/2021</a:t>
             </a:fld>
             <a:endParaRPr lang="en-US"/>
           </a:p>
@@ -3784,12 +3790,12 @@
           <a:p>
             <a:pPr algn="l"/>
             <a:r>
-              <a:rPr lang="en-US" sz="6600">
+              <a:rPr lang="en-US" sz="6600" dirty="0">
                 <a:solidFill>
                   <a:srgbClr val="FFFFFF"/>
                 </a:solidFill>
               </a:rPr>
-              <a:t>Stroke Prediction Model</a:t>
+              <a:t>Stroke Classification Model</a:t>
             </a:r>
           </a:p>
         </p:txBody>
@@ -3825,11 +3831,16 @@
             <a:pPr algn="l"/>
             <a:r>
               <a:rPr lang="en-US" dirty="0"/>
-              <a:t>William </a:t>
-            </a:r>
-            <a:r>
-              <a:rPr lang="en-US" dirty="0" err="1"/>
-              <a:t>Udeh</a:t>
+              <a:t>William Udeh</a:t>
+            </a:r>
+          </a:p>
+          <a:p>
+            <a:pPr algn="l"/>
+            <a:r>
+              <a:rPr lang="en-US" dirty="0">
+                <a:hlinkClick r:id="rId2"/>
+              </a:rPr>
+              <a:t>https://github.com/willudeh99/Stroke-Prediction.git</a:t>
             </a:r>
             <a:endParaRPr lang="en-US" dirty="0"/>
           </a:p>
@@ -4468,7 +4479,19 @@
           <a:p>
             <a:r>
               <a:rPr lang="en-US" sz="2400" dirty="0"/>
-              <a:t>The goal of the project is to see what model has the best representation of the data, being which model has the highest precision/Accuracy of classifying either a patient has had a stroke or not</a:t>
+              <a:t>The goal of the project is to see what model has the best representation of the data, being which model has the highest precision/accuracy and f1-score for classifying the stroke data (</a:t>
+            </a:r>
+            <a:r>
+              <a:rPr lang="en-US" sz="2400" dirty="0">
+                <a:solidFill>
+                  <a:srgbClr val="FF0000"/>
+                </a:solidFill>
+              </a:rPr>
+              <a:t>if a patient has had a stroke or not</a:t>
+            </a:r>
+            <a:r>
+              <a:rPr lang="en-US" sz="2400" dirty="0"/>
+              <a:t>)</a:t>
             </a:r>
           </a:p>
         </p:txBody>
@@ -5105,6 +5128,23 @@
               <a:t>The first step was reading in the stroke data and checking for null values. Null values in this case could seriously mess with the data if left alone, cleaning is essential to getting sound results</a:t>
             </a:r>
           </a:p>
+          <a:p>
+            <a:r>
+              <a:rPr lang="en-US" sz="2400" dirty="0"/>
+              <a:t>The </a:t>
+            </a:r>
+            <a:r>
+              <a:rPr lang="en-US" sz="2400" dirty="0" err="1"/>
+              <a:t>isnull</a:t>
+            </a:r>
+            <a:r>
+              <a:rPr lang="en-US" sz="2400" dirty="0"/>
+              <a:t>().sum() function was used on the data frame to see where the null values were and how many were present</a:t>
+            </a:r>
+          </a:p>
+          <a:p>
+            <a:endParaRPr lang="en-US" sz="2400" dirty="0"/>
+          </a:p>
         </p:txBody>
       </p:sp>
     </p:spTree>
@@ -7684,7 +7724,7 @@
                   <a:srgbClr val="FFFFFF"/>
                 </a:solidFill>
               </a:rPr>
-              <a:t>Project Procedure: Models Part </a:t>
+              <a:t>Project Procedure: Models Part 3</a:t>
             </a:r>
           </a:p>
         </p:txBody>
@@ -7719,27 +7759,25 @@
           <a:p>
             <a:r>
               <a:rPr lang="en-US" sz="2400" dirty="0"/>
-              <a:t>For the training data for each model, I used all of the features except the stroke feature</a:t>
+              <a:t>For the training data for each model, I used all the features but the stroke column so that they could be used as components to help in the classification</a:t>
             </a:r>
           </a:p>
           <a:p>
             <a:r>
               <a:rPr lang="en-US" sz="2400" dirty="0"/>
-              <a:t>In conclusion, I saw that the Random Forest model had the best marks as a model. </a:t>
-            </a:r>
-            <a:r>
-              <a:rPr lang="en-US" sz="2400"/>
-              <a:t>The </a:t>
+              <a:t>In conclusion, the Random Forest model had the best marks. The reason being is that the f1-score was higher in both categories(</a:t>
+            </a:r>
+            <a:r>
+              <a:rPr lang="en-US" sz="2400" dirty="0">
+                <a:solidFill>
+                  <a:srgbClr val="FF0000"/>
+                </a:solidFill>
+              </a:rPr>
+              <a:t>0 and 1</a:t>
             </a:r>
             <a:r>
               <a:rPr lang="en-US" sz="2400" dirty="0"/>
-              <a:t>reason being that the precision to say that this patient had a stroke was at 50% were as in the other models it was lower than 30%</a:t>
-            </a:r>
-          </a:p>
-          <a:p>
-            <a:r>
-              <a:rPr lang="en-US" sz="2400" dirty="0"/>
-              <a:t>The precision to say that this patient did not have a stroke was about the same for each model</a:t>
+              <a:t>). The score was highest in both those regards respectively. The random forest model was followed by the logistic regression and then the SMOTE model in scores.</a:t>
             </a:r>
           </a:p>
         </p:txBody>
@@ -7748,6 +7786,645 @@
     <p:extLst>
       <p:ext uri="{BB962C8B-B14F-4D97-AF65-F5344CB8AC3E}">
         <p14:creationId xmlns:p14="http://schemas.microsoft.com/office/powerpoint/2010/main" val="2432265888"/>
+      </p:ext>
+    </p:extLst>
+  </p:cSld>
+  <p:clrMapOvr>
+    <a:masterClrMapping/>
+  </p:clrMapOvr>
+</p:sld>
+</file>
+
+<file path=ppt/slides/slide8.xml><?xml version="1.0" encoding="utf-8"?>
+<p:sld xmlns:a="http://schemas.openxmlformats.org/drawingml/2006/main" xmlns:r="http://schemas.openxmlformats.org/officeDocument/2006/relationships" xmlns:p="http://schemas.openxmlformats.org/presentationml/2006/main">
+  <p:cSld>
+    <p:bg>
+      <p:bgPr>
+        <a:solidFill>
+          <a:schemeClr val="bg1"/>
+        </a:solidFill>
+        <a:effectLst/>
+      </p:bgPr>
+    </p:bg>
+    <p:spTree>
+      <p:nvGrpSpPr>
+        <p:cNvPr id="1" name=""/>
+        <p:cNvGrpSpPr/>
+        <p:nvPr/>
+      </p:nvGrpSpPr>
+      <p:grpSpPr>
+        <a:xfrm>
+          <a:off x="0" y="0"/>
+          <a:ext cx="0" cy="0"/>
+          <a:chOff x="0" y="0"/>
+          <a:chExt cx="0" cy="0"/>
+        </a:xfrm>
+      </p:grpSpPr>
+      <p:sp useBgFill="1">
+        <p:nvSpPr>
+          <p:cNvPr id="8" name="Rectangle 7">
+            <a:extLst>
+              <a:ext uri="{FF2B5EF4-FFF2-40B4-BE49-F238E27FC236}">
+                <a16:creationId xmlns:a16="http://schemas.microsoft.com/office/drawing/2014/main" id="{827B839B-9ADE-406B-8590-F1CAEDED45A1}"/>
+              </a:ext>
+              <a:ext uri="{C183D7F6-B498-43B3-948B-1728B52AA6E4}">
+                <adec:decorative xmlns:adec="http://schemas.microsoft.com/office/drawing/2017/decorative" val="1"/>
+              </a:ext>
+            </a:extLst>
+          </p:cNvPr>
+          <p:cNvSpPr>
+            <a:spLocks noGrp="1" noRot="1" noChangeAspect="1" noMove="1" noResize="1" noEditPoints="1" noAdjustHandles="1" noChangeArrowheads="1" noChangeShapeType="1" noTextEdit="1"/>
+          </p:cNvSpPr>
+          <p:nvPr>
+            <p:extLst>
+              <p:ext uri="{386F3935-93C4-4BCD-93E2-E3B085C9AB24}">
+                <p16:designElem xmlns:p16="http://schemas.microsoft.com/office/powerpoint/2015/main" val="1"/>
+              </p:ext>
+            </p:extLst>
+          </p:nvPr>
+        </p:nvSpPr>
+        <p:spPr>
+          <a:xfrm>
+            <a:off x="0" y="0"/>
+            <a:ext cx="12188952" cy="6858000"/>
+          </a:xfrm>
+          <a:prstGeom prst="rect">
+            <a:avLst/>
+          </a:prstGeom>
+          <a:ln>
+            <a:noFill/>
+          </a:ln>
+        </p:spPr>
+        <p:style>
+          <a:lnRef idx="2">
+            <a:schemeClr val="accent1">
+              <a:shade val="50000"/>
+            </a:schemeClr>
+          </a:lnRef>
+          <a:fillRef idx="1">
+            <a:schemeClr val="accent1"/>
+          </a:fillRef>
+          <a:effectRef idx="0">
+            <a:schemeClr val="accent1"/>
+          </a:effectRef>
+          <a:fontRef idx="minor">
+            <a:schemeClr val="lt1"/>
+          </a:fontRef>
+        </p:style>
+        <p:txBody>
+          <a:bodyPr rtlCol="0" anchor="ctr"/>
+          <a:lstStyle/>
+          <a:p>
+            <a:pPr algn="ctr"/>
+            <a:endParaRPr lang="en-US"/>
+          </a:p>
+        </p:txBody>
+      </p:sp>
+      <p:sp>
+        <p:nvSpPr>
+          <p:cNvPr id="10" name="Freeform 45">
+            <a:extLst>
+              <a:ext uri="{FF2B5EF4-FFF2-40B4-BE49-F238E27FC236}">
+                <a16:creationId xmlns:a16="http://schemas.microsoft.com/office/drawing/2014/main" id="{CFE45BF0-46DB-408C-B5F7-7B11716805D4}"/>
+              </a:ext>
+              <a:ext uri="{C183D7F6-B498-43B3-948B-1728B52AA6E4}">
+                <adec:decorative xmlns:adec="http://schemas.microsoft.com/office/drawing/2017/decorative" val="1"/>
+              </a:ext>
+            </a:extLst>
+          </p:cNvPr>
+          <p:cNvSpPr>
+            <a:spLocks noGrp="1" noRot="1" noChangeAspect="1" noMove="1" noResize="1" noEditPoints="1" noAdjustHandles="1" noChangeArrowheads="1" noChangeShapeType="1" noTextEdit="1"/>
+          </p:cNvSpPr>
+          <p:nvPr>
+            <p:extLst>
+              <p:ext uri="{386F3935-93C4-4BCD-93E2-E3B085C9AB24}">
+                <p16:designElem xmlns:p16="http://schemas.microsoft.com/office/powerpoint/2015/main" val="1"/>
+              </p:ext>
+            </p:extLst>
+          </p:nvPr>
+        </p:nvSpPr>
+        <p:spPr bwMode="auto">
+          <a:xfrm>
+            <a:off x="409710" y="1022350"/>
+            <a:ext cx="709612" cy="2095501"/>
+          </a:xfrm>
+          <a:custGeom>
+            <a:avLst/>
+            <a:gdLst>
+              <a:gd name="T0" fmla="*/ 447 w 447"/>
+              <a:gd name="T1" fmla="*/ 1363 h 1363"/>
+              <a:gd name="T2" fmla="*/ 0 w 447"/>
+              <a:gd name="T3" fmla="*/ 987 h 1363"/>
+              <a:gd name="T4" fmla="*/ 0 w 447"/>
+              <a:gd name="T5" fmla="*/ 0 h 1363"/>
+              <a:gd name="T6" fmla="*/ 447 w 447"/>
+              <a:gd name="T7" fmla="*/ 376 h 1363"/>
+              <a:gd name="T8" fmla="*/ 447 w 447"/>
+              <a:gd name="T9" fmla="*/ 1363 h 1363"/>
+            </a:gdLst>
+            <a:ahLst/>
+            <a:cxnLst>
+              <a:cxn ang="0">
+                <a:pos x="T0" y="T1"/>
+              </a:cxn>
+              <a:cxn ang="0">
+                <a:pos x="T2" y="T3"/>
+              </a:cxn>
+              <a:cxn ang="0">
+                <a:pos x="T4" y="T5"/>
+              </a:cxn>
+              <a:cxn ang="0">
+                <a:pos x="T6" y="T7"/>
+              </a:cxn>
+              <a:cxn ang="0">
+                <a:pos x="T8" y="T9"/>
+              </a:cxn>
+            </a:cxnLst>
+            <a:rect l="0" t="0" r="r" b="b"/>
+            <a:pathLst>
+              <a:path w="447" h="1363">
+                <a:moveTo>
+                  <a:pt x="447" y="1363"/>
+                </a:moveTo>
+                <a:lnTo>
+                  <a:pt x="0" y="987"/>
+                </a:lnTo>
+                <a:lnTo>
+                  <a:pt x="0" y="0"/>
+                </a:lnTo>
+                <a:lnTo>
+                  <a:pt x="447" y="376"/>
+                </a:lnTo>
+                <a:lnTo>
+                  <a:pt x="447" y="1363"/>
+                </a:lnTo>
+                <a:close/>
+              </a:path>
+            </a:pathLst>
+          </a:custGeom>
+          <a:solidFill>
+            <a:schemeClr val="accent1">
+              <a:lumMod val="50000"/>
+            </a:schemeClr>
+          </a:solidFill>
+          <a:ln>
+            <a:noFill/>
+          </a:ln>
+        </p:spPr>
+        <p:txBody>
+          <a:bodyPr vert="horz" wrap="square" lIns="91440" tIns="45720" rIns="91440" bIns="45720" numCol="1" anchor="t" anchorCtr="0" compatLnSpc="1">
+            <a:prstTxWarp prst="textNoShape">
+              <a:avLst/>
+            </a:prstTxWarp>
+          </a:bodyPr>
+          <a:lstStyle/>
+          <a:p>
+            <a:endParaRPr lang="en-US"/>
+          </a:p>
+        </p:txBody>
+      </p:sp>
+      <p:sp>
+        <p:nvSpPr>
+          <p:cNvPr id="12" name="Freeform 46">
+            <a:extLst>
+              <a:ext uri="{FF2B5EF4-FFF2-40B4-BE49-F238E27FC236}">
+                <a16:creationId xmlns:a16="http://schemas.microsoft.com/office/drawing/2014/main" id="{2AEBC8F2-97B1-41B4-93F1-2D289E197FBA}"/>
+              </a:ext>
+              <a:ext uri="{C183D7F6-B498-43B3-948B-1728B52AA6E4}">
+                <adec:decorative xmlns:adec="http://schemas.microsoft.com/office/drawing/2017/decorative" val="1"/>
+              </a:ext>
+            </a:extLst>
+          </p:cNvPr>
+          <p:cNvSpPr>
+            <a:spLocks noGrp="1" noRot="1" noChangeAspect="1" noMove="1" noResize="1" noEditPoints="1" noAdjustHandles="1" noChangeArrowheads="1" noChangeShapeType="1" noTextEdit="1"/>
+          </p:cNvSpPr>
+          <p:nvPr>
+            <p:extLst>
+              <p:ext uri="{386F3935-93C4-4BCD-93E2-E3B085C9AB24}">
+                <p16:designElem xmlns:p16="http://schemas.microsoft.com/office/powerpoint/2015/main" val="1"/>
+              </p:ext>
+            </p:extLst>
+          </p:nvPr>
+        </p:nvSpPr>
+        <p:spPr bwMode="auto">
+          <a:xfrm>
+            <a:off x="409710" y="837744"/>
+            <a:ext cx="403225" cy="1705431"/>
+          </a:xfrm>
+          <a:custGeom>
+            <a:avLst/>
+            <a:gdLst>
+              <a:gd name="T0" fmla="*/ 254 w 254"/>
+              <a:gd name="T1" fmla="*/ 987 h 1109"/>
+              <a:gd name="T2" fmla="*/ 0 w 254"/>
+              <a:gd name="T3" fmla="*/ 1109 h 1109"/>
+              <a:gd name="T4" fmla="*/ 0 w 254"/>
+              <a:gd name="T5" fmla="*/ 119 h 1109"/>
+              <a:gd name="T6" fmla="*/ 254 w 254"/>
+              <a:gd name="T7" fmla="*/ 0 h 1109"/>
+              <a:gd name="T8" fmla="*/ 254 w 254"/>
+              <a:gd name="T9" fmla="*/ 987 h 1109"/>
+            </a:gdLst>
+            <a:ahLst/>
+            <a:cxnLst>
+              <a:cxn ang="0">
+                <a:pos x="T0" y="T1"/>
+              </a:cxn>
+              <a:cxn ang="0">
+                <a:pos x="T2" y="T3"/>
+              </a:cxn>
+              <a:cxn ang="0">
+                <a:pos x="T4" y="T5"/>
+              </a:cxn>
+              <a:cxn ang="0">
+                <a:pos x="T6" y="T7"/>
+              </a:cxn>
+              <a:cxn ang="0">
+                <a:pos x="T8" y="T9"/>
+              </a:cxn>
+            </a:cxnLst>
+            <a:rect l="0" t="0" r="r" b="b"/>
+            <a:pathLst>
+              <a:path w="254" h="1109">
+                <a:moveTo>
+                  <a:pt x="254" y="987"/>
+                </a:moveTo>
+                <a:lnTo>
+                  <a:pt x="0" y="1109"/>
+                </a:lnTo>
+                <a:lnTo>
+                  <a:pt x="0" y="119"/>
+                </a:lnTo>
+                <a:lnTo>
+                  <a:pt x="254" y="0"/>
+                </a:lnTo>
+                <a:lnTo>
+                  <a:pt x="254" y="987"/>
+                </a:lnTo>
+                <a:close/>
+              </a:path>
+            </a:pathLst>
+          </a:custGeom>
+          <a:solidFill>
+            <a:schemeClr val="accent1">
+              <a:lumMod val="75000"/>
+            </a:schemeClr>
+          </a:solidFill>
+          <a:ln>
+            <a:noFill/>
+          </a:ln>
+        </p:spPr>
+        <p:txBody>
+          <a:bodyPr vert="horz" wrap="square" lIns="91440" tIns="45720" rIns="91440" bIns="45720" numCol="1" anchor="t" anchorCtr="0" compatLnSpc="1">
+            <a:prstTxWarp prst="textNoShape">
+              <a:avLst/>
+            </a:prstTxWarp>
+          </a:bodyPr>
+          <a:lstStyle/>
+          <a:p>
+            <a:endParaRPr lang="en-US"/>
+          </a:p>
+        </p:txBody>
+      </p:sp>
+      <p:sp>
+        <p:nvSpPr>
+          <p:cNvPr id="14" name="Freeform 47">
+            <a:extLst>
+              <a:ext uri="{FF2B5EF4-FFF2-40B4-BE49-F238E27FC236}">
+                <a16:creationId xmlns:a16="http://schemas.microsoft.com/office/drawing/2014/main" id="{472E3A19-F5D5-48FC-BB9C-48C2F68F598B}"/>
+              </a:ext>
+              <a:ext uri="{C183D7F6-B498-43B3-948B-1728B52AA6E4}">
+                <adec:decorative xmlns:adec="http://schemas.microsoft.com/office/drawing/2017/decorative" val="1"/>
+              </a:ext>
+            </a:extLst>
+          </p:cNvPr>
+          <p:cNvSpPr>
+            <a:spLocks noGrp="1" noRot="1" noChangeAspect="1" noMove="1" noResize="1" noEditPoints="1" noAdjustHandles="1" noChangeArrowheads="1" noChangeShapeType="1" noTextEdit="1"/>
+          </p:cNvSpPr>
+          <p:nvPr>
+            <p:extLst>
+              <p:ext uri="{386F3935-93C4-4BCD-93E2-E3B085C9AB24}">
+                <p16:designElem xmlns:p16="http://schemas.microsoft.com/office/powerpoint/2015/main" val="1"/>
+              </p:ext>
+            </p:extLst>
+          </p:nvPr>
+        </p:nvSpPr>
+        <p:spPr bwMode="auto">
+          <a:xfrm>
+            <a:off x="644660" y="640894"/>
+            <a:ext cx="168275" cy="1713195"/>
+          </a:xfrm>
+          <a:custGeom>
+            <a:avLst/>
+            <a:gdLst>
+              <a:gd name="T0" fmla="*/ 106 w 106"/>
+              <a:gd name="T1" fmla="*/ 1114 h 1114"/>
+              <a:gd name="T2" fmla="*/ 0 w 106"/>
+              <a:gd name="T3" fmla="*/ 1005 h 1114"/>
+              <a:gd name="T4" fmla="*/ 0 w 106"/>
+              <a:gd name="T5" fmla="*/ 0 h 1114"/>
+              <a:gd name="T6" fmla="*/ 106 w 106"/>
+              <a:gd name="T7" fmla="*/ 110 h 1114"/>
+              <a:gd name="T8" fmla="*/ 106 w 106"/>
+              <a:gd name="T9" fmla="*/ 1114 h 1114"/>
+            </a:gdLst>
+            <a:ahLst/>
+            <a:cxnLst>
+              <a:cxn ang="0">
+                <a:pos x="T0" y="T1"/>
+              </a:cxn>
+              <a:cxn ang="0">
+                <a:pos x="T2" y="T3"/>
+              </a:cxn>
+              <a:cxn ang="0">
+                <a:pos x="T4" y="T5"/>
+              </a:cxn>
+              <a:cxn ang="0">
+                <a:pos x="T6" y="T7"/>
+              </a:cxn>
+              <a:cxn ang="0">
+                <a:pos x="T8" y="T9"/>
+              </a:cxn>
+            </a:cxnLst>
+            <a:rect l="0" t="0" r="r" b="b"/>
+            <a:pathLst>
+              <a:path w="106" h="1114">
+                <a:moveTo>
+                  <a:pt x="106" y="1114"/>
+                </a:moveTo>
+                <a:lnTo>
+                  <a:pt x="0" y="1005"/>
+                </a:lnTo>
+                <a:lnTo>
+                  <a:pt x="0" y="0"/>
+                </a:lnTo>
+                <a:lnTo>
+                  <a:pt x="106" y="110"/>
+                </a:lnTo>
+                <a:lnTo>
+                  <a:pt x="106" y="1114"/>
+                </a:lnTo>
+                <a:close/>
+              </a:path>
+            </a:pathLst>
+          </a:custGeom>
+          <a:solidFill>
+            <a:schemeClr val="accent1">
+              <a:lumMod val="50000"/>
+            </a:schemeClr>
+          </a:solidFill>
+          <a:ln>
+            <a:noFill/>
+          </a:ln>
+        </p:spPr>
+        <p:txBody>
+          <a:bodyPr vert="horz" wrap="square" lIns="91440" tIns="45720" rIns="91440" bIns="45720" numCol="1" anchor="t" anchorCtr="0" compatLnSpc="1">
+            <a:prstTxWarp prst="textNoShape">
+              <a:avLst/>
+            </a:prstTxWarp>
+          </a:bodyPr>
+          <a:lstStyle/>
+          <a:p>
+            <a:endParaRPr lang="en-US"/>
+          </a:p>
+        </p:txBody>
+      </p:sp>
+      <p:sp>
+        <p:nvSpPr>
+          <p:cNvPr id="16" name="Freeform 44">
+            <a:extLst>
+              <a:ext uri="{FF2B5EF4-FFF2-40B4-BE49-F238E27FC236}">
+                <a16:creationId xmlns:a16="http://schemas.microsoft.com/office/drawing/2014/main" id="{7A62E32F-BB65-43A8-8EB5-92346890E549}"/>
+              </a:ext>
+              <a:ext uri="{C183D7F6-B498-43B3-948B-1728B52AA6E4}">
+                <adec:decorative xmlns:adec="http://schemas.microsoft.com/office/drawing/2017/decorative" val="1"/>
+              </a:ext>
+            </a:extLst>
+          </p:cNvPr>
+          <p:cNvSpPr>
+            <a:spLocks noGrp="1" noRot="1" noChangeAspect="1" noMove="1" noResize="1" noEditPoints="1" noAdjustHandles="1" noChangeArrowheads="1" noChangeShapeType="1" noTextEdit="1"/>
+          </p:cNvSpPr>
+          <p:nvPr>
+            <p:extLst>
+              <p:ext uri="{386F3935-93C4-4BCD-93E2-E3B085C9AB24}">
+                <p16:designElem xmlns:p16="http://schemas.microsoft.com/office/powerpoint/2015/main" val="1"/>
+              </p:ext>
+            </p:extLst>
+          </p:nvPr>
+        </p:nvSpPr>
+        <p:spPr bwMode="auto">
+          <a:xfrm>
+            <a:off x="11223203" y="635716"/>
+            <a:ext cx="328612" cy="1742360"/>
+          </a:xfrm>
+          <a:custGeom>
+            <a:avLst/>
+            <a:gdLst>
+              <a:gd name="T0" fmla="*/ 207 w 207"/>
+              <a:gd name="T1" fmla="*/ 987 h 1114"/>
+              <a:gd name="T2" fmla="*/ 0 w 207"/>
+              <a:gd name="T3" fmla="*/ 1114 h 1114"/>
+              <a:gd name="T4" fmla="*/ 0 w 207"/>
+              <a:gd name="T5" fmla="*/ 127 h 1114"/>
+              <a:gd name="T6" fmla="*/ 207 w 207"/>
+              <a:gd name="T7" fmla="*/ 0 h 1114"/>
+              <a:gd name="T8" fmla="*/ 207 w 207"/>
+              <a:gd name="T9" fmla="*/ 987 h 1114"/>
+            </a:gdLst>
+            <a:ahLst/>
+            <a:cxnLst>
+              <a:cxn ang="0">
+                <a:pos x="T0" y="T1"/>
+              </a:cxn>
+              <a:cxn ang="0">
+                <a:pos x="T2" y="T3"/>
+              </a:cxn>
+              <a:cxn ang="0">
+                <a:pos x="T4" y="T5"/>
+              </a:cxn>
+              <a:cxn ang="0">
+                <a:pos x="T6" y="T7"/>
+              </a:cxn>
+              <a:cxn ang="0">
+                <a:pos x="T8" y="T9"/>
+              </a:cxn>
+            </a:cxnLst>
+            <a:rect l="0" t="0" r="r" b="b"/>
+            <a:pathLst>
+              <a:path w="207" h="1114">
+                <a:moveTo>
+                  <a:pt x="207" y="987"/>
+                </a:moveTo>
+                <a:lnTo>
+                  <a:pt x="0" y="1114"/>
+                </a:lnTo>
+                <a:lnTo>
+                  <a:pt x="0" y="127"/>
+                </a:lnTo>
+                <a:lnTo>
+                  <a:pt x="207" y="0"/>
+                </a:lnTo>
+                <a:lnTo>
+                  <a:pt x="207" y="987"/>
+                </a:lnTo>
+                <a:close/>
+              </a:path>
+            </a:pathLst>
+          </a:custGeom>
+          <a:solidFill>
+            <a:schemeClr val="accent1">
+              <a:lumMod val="50000"/>
+            </a:schemeClr>
+          </a:solidFill>
+          <a:ln>
+            <a:noFill/>
+          </a:ln>
+        </p:spPr>
+        <p:txBody>
+          <a:bodyPr vert="horz" wrap="square" lIns="91440" tIns="45720" rIns="91440" bIns="45720" numCol="1" anchor="t" anchorCtr="0" compatLnSpc="1">
+            <a:prstTxWarp prst="textNoShape">
+              <a:avLst/>
+            </a:prstTxWarp>
+          </a:bodyPr>
+          <a:lstStyle/>
+          <a:p>
+            <a:endParaRPr lang="en-US"/>
+          </a:p>
+        </p:txBody>
+      </p:sp>
+      <p:sp>
+        <p:nvSpPr>
+          <p:cNvPr id="18" name="Rectangle 17">
+            <a:extLst>
+              <a:ext uri="{FF2B5EF4-FFF2-40B4-BE49-F238E27FC236}">
+                <a16:creationId xmlns:a16="http://schemas.microsoft.com/office/drawing/2014/main" id="{14E91B64-9FCC-451E-AFB4-A827D6329367}"/>
+              </a:ext>
+              <a:ext uri="{C183D7F6-B498-43B3-948B-1728B52AA6E4}">
+                <adec:decorative xmlns:adec="http://schemas.microsoft.com/office/drawing/2017/decorative" val="1"/>
+              </a:ext>
+            </a:extLst>
+          </p:cNvPr>
+          <p:cNvSpPr>
+            <a:spLocks noGrp="1" noRot="1" noChangeAspect="1" noMove="1" noResize="1" noEditPoints="1" noAdjustHandles="1" noChangeArrowheads="1" noChangeShapeType="1" noTextEdit="1"/>
+          </p:cNvSpPr>
+          <p:nvPr>
+            <p:extLst>
+              <p:ext uri="{386F3935-93C4-4BCD-93E2-E3B085C9AB24}">
+                <p16:designElem xmlns:p16="http://schemas.microsoft.com/office/powerpoint/2015/main" val="1"/>
+              </p:ext>
+            </p:extLst>
+          </p:nvPr>
+        </p:nvSpPr>
+        <p:spPr bwMode="auto">
+          <a:xfrm>
+            <a:off x="644055" y="635715"/>
+            <a:ext cx="10907863" cy="1541457"/>
+          </a:xfrm>
+          <a:prstGeom prst="rect">
+            <a:avLst/>
+          </a:prstGeom>
+          <a:solidFill>
+            <a:schemeClr val="accent1"/>
+          </a:solidFill>
+          <a:ln>
+            <a:noFill/>
+          </a:ln>
+        </p:spPr>
+        <p:txBody>
+          <a:bodyPr vert="horz" wrap="square" lIns="91440" tIns="45720" rIns="91440" bIns="45720" numCol="1" anchor="t" anchorCtr="0" compatLnSpc="1">
+            <a:prstTxWarp prst="textNoShape">
+              <a:avLst/>
+            </a:prstTxWarp>
+          </a:bodyPr>
+          <a:lstStyle/>
+          <a:p>
+            <a:endParaRPr lang="en-US"/>
+          </a:p>
+        </p:txBody>
+      </p:sp>
+      <p:sp>
+        <p:nvSpPr>
+          <p:cNvPr id="2" name="Title 1">
+            <a:extLst>
+              <a:ext uri="{FF2B5EF4-FFF2-40B4-BE49-F238E27FC236}">
+                <a16:creationId xmlns:a16="http://schemas.microsoft.com/office/drawing/2014/main" id="{D8FE350F-F188-488C-AA32-CD591D0B1FCF}"/>
+              </a:ext>
+            </a:extLst>
+          </p:cNvPr>
+          <p:cNvSpPr>
+            <a:spLocks noGrp="1"/>
+          </p:cNvSpPr>
+          <p:nvPr>
+            <p:ph type="title"/>
+          </p:nvPr>
+        </p:nvSpPr>
+        <p:spPr>
+          <a:xfrm>
+            <a:off x="958506" y="800392"/>
+            <a:ext cx="10264697" cy="1212102"/>
+          </a:xfrm>
+        </p:spPr>
+        <p:txBody>
+          <a:bodyPr>
+            <a:normAutofit/>
+          </a:bodyPr>
+          <a:lstStyle/>
+          <a:p>
+            <a:r>
+              <a:rPr lang="en-US" sz="4000" dirty="0">
+                <a:solidFill>
+                  <a:srgbClr val="FFFFFF"/>
+                </a:solidFill>
+              </a:rPr>
+              <a:t>End of Presentation</a:t>
+            </a:r>
+          </a:p>
+        </p:txBody>
+      </p:sp>
+      <p:sp>
+        <p:nvSpPr>
+          <p:cNvPr id="3" name="Content Placeholder 2">
+            <a:extLst>
+              <a:ext uri="{FF2B5EF4-FFF2-40B4-BE49-F238E27FC236}">
+                <a16:creationId xmlns:a16="http://schemas.microsoft.com/office/drawing/2014/main" id="{27F38773-37DD-455E-BC3F-4A98BD8964AD}"/>
+              </a:ext>
+            </a:extLst>
+          </p:cNvPr>
+          <p:cNvSpPr>
+            <a:spLocks noGrp="1"/>
+          </p:cNvSpPr>
+          <p:nvPr>
+            <p:ph idx="1"/>
+          </p:nvPr>
+        </p:nvSpPr>
+        <p:spPr>
+          <a:xfrm>
+            <a:off x="1367624" y="2490436"/>
+            <a:ext cx="9708995" cy="3567173"/>
+          </a:xfrm>
+        </p:spPr>
+        <p:txBody>
+          <a:bodyPr anchor="ctr">
+            <a:normAutofit/>
+          </a:bodyPr>
+          <a:lstStyle/>
+          <a:p>
+            <a:pPr marL="0" indent="0" algn="ctr">
+              <a:buNone/>
+            </a:pPr>
+            <a:r>
+              <a:rPr lang="en-US" sz="7200" dirty="0">
+                <a:latin typeface="Bodoni MT" panose="02070603080606020203" pitchFamily="18" charset="0"/>
+              </a:rPr>
+              <a:t>Comments and Questions</a:t>
+            </a:r>
+          </a:p>
+        </p:txBody>
+      </p:sp>
+    </p:spTree>
+    <p:extLst>
+      <p:ext uri="{BB962C8B-B14F-4D97-AF65-F5344CB8AC3E}">
+        <p14:creationId xmlns:p14="http://schemas.microsoft.com/office/powerpoint/2010/main" val="1993112922"/>
       </p:ext>
     </p:extLst>
   </p:cSld>

</xml_diff>